<commit_message>
Added support for notes, horizontal cell alignment. Removed default first row special formatting. Set default table row height to minimum.
</commit_message>
<xml_diff>
--- a/data/sample_presentation_09.21.20.pptx
+++ b/data/sample_presentation_09.21.20.pptx
@@ -830,33 +830,13 @@
         <p:txBody>
           <a:bodyPr/>
           <a:lstStyle/>
-          <a:p>
-            <a:r>
-              <a:rPr lang="en-US" dirty="0"/>
-              <a:t>Notes</a:t>
-            </a:r>
-          </a:p>
-          <a:p>
-            <a:r>
-              <a:rPr lang="en-US" dirty="0"/>
-              <a:t>Notes</a:t>
-            </a:r>
-          </a:p>
-          <a:p>
-            <a:r>
-              <a:rPr lang="en-US" dirty="0"/>
-              <a:t>Notes</a:t>
-            </a:r>
-          </a:p>
-          <a:p>
-            <a:r>
-              <a:rPr lang="en-US" dirty="0"/>
-              <a:t>Notes</a:t>
-            </a:r>
-          </a:p>
-          <a:p>
-            <a:endParaRPr lang="en-US" dirty="0"/>
-          </a:p>
+          <a:p/>
+          <a:p>
+            <a:r>
+              <a:t>Today is 09/21</a:t>
+            </a:r>
+          </a:p>
+          <a:p/>
         </p:txBody>
       </p:sp>
       <p:sp>
@@ -5975,12 +5955,12 @@
         </p:nvGraphicFramePr>
         <p:xfrm>
           <a:off x="0" y="914400"/>
-          <a:ext cx="12191695" cy="3657600"/>
+          <a:ext cx="12191695" cy="0"/>
         </p:xfrm>
         <a:graphic>
           <a:graphicData uri="http://schemas.openxmlformats.org/drawingml/2006/table">
             <a:tbl>
-              <a:tblPr firstRow="1" bandRow="1">
+              <a:tblPr bandRow="1">
                 <a:tableStyleId>{5C22544A-7EE6-4342-B048-85BDC9FD1C3A}</a:tableStyleId>
               </a:tblPr>
               <a:tblGrid>
@@ -5993,14 +5973,15 @@
                 <a:gridCol w="1523961"/>
                 <a:gridCol w="1523968"/>
               </a:tblGrid>
-              <a:tr h="304800">
+              <a:tr h="0">
                 <a:tc rowSpan="2">
                   <a:txBody>
                     <a:bodyPr/>
                     <a:lstStyle/>
                     <a:p>
-                      <a:r>
-                        <a:rPr sz="1100">
+                      <a:pPr algn="ctr"/>
+                      <a:r>
+                        <a:rPr sz="800">
                           <a:solidFill>
                             <a:srgbClr val="000000"/>
                           </a:solidFill>
@@ -6021,7 +6002,7 @@
                     <a:lstStyle/>
                     <a:p>
                       <a:r>
-                        <a:rPr sz="1100">
+                        <a:rPr sz="800">
                           <a:solidFill>
                             <a:srgbClr val="000000"/>
                           </a:solidFill>
@@ -6042,7 +6023,7 @@
                     <a:lstStyle/>
                     <a:p>
                       <a:r>
-                        <a:rPr sz="1100">
+                        <a:rPr sz="800">
                           <a:solidFill>
                             <a:srgbClr val="000000"/>
                           </a:solidFill>
@@ -6063,7 +6044,7 @@
                     <a:lstStyle/>
                     <a:p>
                       <a:r>
-                        <a:rPr sz="1100">
+                        <a:rPr sz="800">
                           <a:solidFill>
                             <a:srgbClr val="000000"/>
                           </a:solidFill>
@@ -6084,7 +6065,7 @@
                     <a:lstStyle/>
                     <a:p>
                       <a:r>
-                        <a:rPr sz="1100">
+                        <a:rPr sz="800">
                           <a:solidFill>
                             <a:srgbClr val="000000"/>
                           </a:solidFill>
@@ -6105,7 +6086,7 @@
                     <a:lstStyle/>
                     <a:p>
                       <a:r>
-                        <a:rPr sz="1100">
+                        <a:rPr sz="800">
                           <a:solidFill>
                             <a:srgbClr val="000000"/>
                           </a:solidFill>
@@ -6126,7 +6107,7 @@
                     <a:lstStyle/>
                     <a:p>
                       <a:r>
-                        <a:rPr sz="1100">
+                        <a:rPr sz="800">
                           <a:solidFill>
                             <a:srgbClr val="000000"/>
                           </a:solidFill>
@@ -6147,7 +6128,7 @@
                     <a:lstStyle/>
                     <a:p>
                       <a:r>
-                        <a:rPr sz="1100">
+                        <a:rPr sz="800">
                           <a:solidFill>
                             <a:srgbClr val="000000"/>
                           </a:solidFill>
@@ -6163,14 +6144,14 @@
                   </a:tcPr>
                 </a:tc>
               </a:tr>
-              <a:tr h="304800">
+              <a:tr h="0">
                 <a:tc vMerge="1">
                   <a:txBody>
                     <a:bodyPr/>
                     <a:lstStyle/>
                     <a:p>
                       <a:r>
-                        <a:rPr sz="1100">
+                        <a:rPr sz="800">
                           <a:solidFill>
                             <a:srgbClr val="000000"/>
                           </a:solidFill>
@@ -6191,7 +6172,7 @@
                     <a:lstStyle/>
                     <a:p>
                       <a:r>
-                        <a:rPr sz="1100">
+                        <a:rPr sz="800">
                           <a:solidFill>
                             <a:srgbClr val="000000"/>
                           </a:solidFill>
@@ -6212,7 +6193,7 @@
                     <a:lstStyle/>
                     <a:p>
                       <a:r>
-                        <a:rPr sz="1100">
+                        <a:rPr sz="800">
                           <a:solidFill>
                             <a:srgbClr val="000000"/>
                           </a:solidFill>
@@ -6233,7 +6214,7 @@
                     <a:lstStyle/>
                     <a:p>
                       <a:r>
-                        <a:rPr sz="1100">
+                        <a:rPr sz="800">
                           <a:solidFill>
                             <a:srgbClr val="000000"/>
                           </a:solidFill>
@@ -6254,7 +6235,7 @@
                     <a:lstStyle/>
                     <a:p>
                       <a:r>
-                        <a:rPr sz="1100">
+                        <a:rPr sz="800">
                           <a:solidFill>
                             <a:srgbClr val="000000"/>
                           </a:solidFill>
@@ -6275,7 +6256,7 @@
                     <a:lstStyle/>
                     <a:p>
                       <a:r>
-                        <a:rPr sz="1100">
+                        <a:rPr sz="800">
                           <a:solidFill>
                             <a:srgbClr val="000000"/>
                           </a:solidFill>
@@ -6296,7 +6277,7 @@
                     <a:lstStyle/>
                     <a:p>
                       <a:r>
-                        <a:rPr sz="1100">
+                        <a:rPr sz="800">
                           <a:solidFill>
                             <a:srgbClr val="000000"/>
                           </a:solidFill>
@@ -6317,7 +6298,7 @@
                     <a:lstStyle/>
                     <a:p>
                       <a:r>
-                        <a:rPr sz="1100">
+                        <a:rPr sz="800">
                           <a:solidFill>
                             <a:srgbClr val="000000"/>
                           </a:solidFill>
@@ -6333,14 +6314,14 @@
                   </a:tcPr>
                 </a:tc>
               </a:tr>
-              <a:tr h="304800">
-                <a:tc>
-                  <a:txBody>
-                    <a:bodyPr/>
-                    <a:lstStyle/>
-                    <a:p>
-                      <a:r>
-                        <a:rPr sz="1100">
+              <a:tr h="0">
+                <a:tc>
+                  <a:txBody>
+                    <a:bodyPr/>
+                    <a:lstStyle/>
+                    <a:p>
+                      <a:r>
+                        <a:rPr sz="800">
                           <a:solidFill>
                             <a:srgbClr val="000000"/>
                           </a:solidFill>
@@ -6361,7 +6342,7 @@
                     <a:lstStyle/>
                     <a:p>
                       <a:r>
-                        <a:rPr sz="1100">
+                        <a:rPr sz="800">
                           <a:solidFill>
                             <a:srgbClr val="000000"/>
                           </a:solidFill>
@@ -6382,7 +6363,7 @@
                     <a:lstStyle/>
                     <a:p>
                       <a:r>
-                        <a:rPr sz="1100">
+                        <a:rPr sz="800">
                           <a:solidFill>
                             <a:srgbClr val="000000"/>
                           </a:solidFill>
@@ -6403,7 +6384,7 @@
                     <a:lstStyle/>
                     <a:p>
                       <a:r>
-                        <a:rPr sz="1100">
+                        <a:rPr sz="800">
                           <a:solidFill>
                             <a:srgbClr val="000000"/>
                           </a:solidFill>
@@ -6424,7 +6405,7 @@
                     <a:lstStyle/>
                     <a:p>
                       <a:r>
-                        <a:rPr sz="1100">
+                        <a:rPr sz="800">
                           <a:solidFill>
                             <a:srgbClr val="000000"/>
                           </a:solidFill>
@@ -6445,7 +6426,7 @@
                     <a:lstStyle/>
                     <a:p>
                       <a:r>
-                        <a:rPr sz="1100">
+                        <a:rPr sz="800">
                           <a:solidFill>
                             <a:srgbClr val="000000"/>
                           </a:solidFill>
@@ -6466,7 +6447,7 @@
                     <a:lstStyle/>
                     <a:p>
                       <a:r>
-                        <a:rPr sz="1100">
+                        <a:rPr sz="800">
                           <a:solidFill>
                             <a:srgbClr val="000000"/>
                           </a:solidFill>
@@ -6487,7 +6468,7 @@
                     <a:lstStyle/>
                     <a:p>
                       <a:r>
-                        <a:rPr sz="1100">
+                        <a:rPr sz="800">
                           <a:solidFill>
                             <a:srgbClr val="000000"/>
                           </a:solidFill>
@@ -6503,14 +6484,14 @@
                   </a:tcPr>
                 </a:tc>
               </a:tr>
-              <a:tr h="304800">
-                <a:tc>
-                  <a:txBody>
-                    <a:bodyPr/>
-                    <a:lstStyle/>
-                    <a:p>
-                      <a:r>
-                        <a:rPr sz="1100">
+              <a:tr h="0">
+                <a:tc>
+                  <a:txBody>
+                    <a:bodyPr/>
+                    <a:lstStyle/>
+                    <a:p>
+                      <a:r>
+                        <a:rPr sz="800">
                           <a:solidFill>
                             <a:srgbClr val="000000"/>
                           </a:solidFill>
@@ -6531,7 +6512,7 @@
                     <a:lstStyle/>
                     <a:p>
                       <a:r>
-                        <a:rPr sz="1100">
+                        <a:rPr sz="800">
                           <a:solidFill>
                             <a:srgbClr val="000000"/>
                           </a:solidFill>
@@ -6552,7 +6533,7 @@
                     <a:lstStyle/>
                     <a:p>
                       <a:r>
-                        <a:rPr sz="1100">
+                        <a:rPr sz="800">
                           <a:solidFill>
                             <a:srgbClr val="000000"/>
                           </a:solidFill>
@@ -6573,7 +6554,7 @@
                     <a:lstStyle/>
                     <a:p>
                       <a:r>
-                        <a:rPr sz="1100">
+                        <a:rPr sz="800">
                           <a:solidFill>
                             <a:srgbClr val="000000"/>
                           </a:solidFill>
@@ -6594,7 +6575,7 @@
                     <a:lstStyle/>
                     <a:p>
                       <a:r>
-                        <a:rPr sz="1100">
+                        <a:rPr sz="800">
                           <a:solidFill>
                             <a:srgbClr val="FF0000"/>
                           </a:solidFill>
@@ -6615,7 +6596,7 @@
                     <a:lstStyle/>
                     <a:p>
                       <a:r>
-                        <a:rPr sz="1100">
+                        <a:rPr sz="800">
                           <a:solidFill>
                             <a:srgbClr val="000000"/>
                           </a:solidFill>
@@ -6636,7 +6617,7 @@
                     <a:lstStyle/>
                     <a:p>
                       <a:r>
-                        <a:rPr sz="1100">
+                        <a:rPr sz="800">
                           <a:solidFill>
                             <a:srgbClr val="000000"/>
                           </a:solidFill>
@@ -6657,7 +6638,7 @@
                     <a:lstStyle/>
                     <a:p>
                       <a:r>
-                        <a:rPr sz="1100">
+                        <a:rPr sz="800">
                           <a:solidFill>
                             <a:srgbClr val="000000"/>
                           </a:solidFill>
@@ -6673,14 +6654,14 @@
                   </a:tcPr>
                 </a:tc>
               </a:tr>
-              <a:tr h="304800">
-                <a:tc>
-                  <a:txBody>
-                    <a:bodyPr/>
-                    <a:lstStyle/>
-                    <a:p>
-                      <a:r>
-                        <a:rPr sz="1100">
+              <a:tr h="0">
+                <a:tc>
+                  <a:txBody>
+                    <a:bodyPr/>
+                    <a:lstStyle/>
+                    <a:p>
+                      <a:r>
+                        <a:rPr sz="800">
                           <a:solidFill>
                             <a:srgbClr val="000000"/>
                           </a:solidFill>
@@ -6701,7 +6682,7 @@
                     <a:lstStyle/>
                     <a:p>
                       <a:r>
-                        <a:rPr sz="1100">
+                        <a:rPr sz="800">
                           <a:solidFill>
                             <a:srgbClr val="000000"/>
                           </a:solidFill>
@@ -6722,7 +6703,7 @@
                     <a:lstStyle/>
                     <a:p>
                       <a:r>
-                        <a:rPr sz="1100">
+                        <a:rPr sz="800">
                           <a:solidFill>
                             <a:srgbClr val="000000"/>
                           </a:solidFill>
@@ -6743,7 +6724,7 @@
                     <a:lstStyle/>
                     <a:p>
                       <a:r>
-                        <a:rPr sz="1100">
+                        <a:rPr sz="800">
                           <a:solidFill>
                             <a:srgbClr val="000000"/>
                           </a:solidFill>
@@ -6764,7 +6745,7 @@
                     <a:lstStyle/>
                     <a:p>
                       <a:r>
-                        <a:rPr sz="1100">
+                        <a:rPr sz="800">
                           <a:solidFill>
                             <a:srgbClr val="FF0000"/>
                           </a:solidFill>
@@ -6785,7 +6766,7 @@
                     <a:lstStyle/>
                     <a:p>
                       <a:r>
-                        <a:rPr sz="1100">
+                        <a:rPr sz="800">
                           <a:solidFill>
                             <a:srgbClr val="000000"/>
                           </a:solidFill>
@@ -6806,7 +6787,7 @@
                     <a:lstStyle/>
                     <a:p>
                       <a:r>
-                        <a:rPr sz="1100">
+                        <a:rPr sz="800">
                           <a:solidFill>
                             <a:srgbClr val="000000"/>
                           </a:solidFill>
@@ -6827,7 +6808,7 @@
                     <a:lstStyle/>
                     <a:p>
                       <a:r>
-                        <a:rPr sz="1100">
+                        <a:rPr sz="800">
                           <a:solidFill>
                             <a:srgbClr val="4472C4"/>
                           </a:solidFill>
@@ -6843,14 +6824,14 @@
                   </a:tcPr>
                 </a:tc>
               </a:tr>
-              <a:tr h="304800">
-                <a:tc>
-                  <a:txBody>
-                    <a:bodyPr/>
-                    <a:lstStyle/>
-                    <a:p>
-                      <a:r>
-                        <a:rPr sz="1100">
+              <a:tr h="0">
+                <a:tc>
+                  <a:txBody>
+                    <a:bodyPr/>
+                    <a:lstStyle/>
+                    <a:p>
+                      <a:r>
+                        <a:rPr sz="800">
                           <a:solidFill>
                             <a:srgbClr val="000000"/>
                           </a:solidFill>
@@ -6871,7 +6852,7 @@
                     <a:lstStyle/>
                     <a:p>
                       <a:r>
-                        <a:rPr sz="1100">
+                        <a:rPr sz="800">
                           <a:solidFill>
                             <a:srgbClr val="000000"/>
                           </a:solidFill>
@@ -6892,7 +6873,7 @@
                     <a:lstStyle/>
                     <a:p>
                       <a:r>
-                        <a:rPr sz="1100">
+                        <a:rPr sz="800">
                           <a:solidFill>
                             <a:srgbClr val="FF0000"/>
                           </a:solidFill>
@@ -6913,7 +6894,7 @@
                     <a:lstStyle/>
                     <a:p>
                       <a:r>
-                        <a:rPr sz="1100">
+                        <a:rPr sz="800">
                           <a:solidFill>
                             <a:srgbClr val="000000"/>
                           </a:solidFill>
@@ -6934,7 +6915,7 @@
                     <a:lstStyle/>
                     <a:p>
                       <a:r>
-                        <a:rPr sz="1100">
+                        <a:rPr sz="800">
                           <a:solidFill>
                             <a:srgbClr val="FF0000"/>
                           </a:solidFill>
@@ -6955,7 +6936,7 @@
                     <a:lstStyle/>
                     <a:p>
                       <a:r>
-                        <a:rPr sz="1100">
+                        <a:rPr sz="800">
                           <a:solidFill>
                             <a:srgbClr val="000000"/>
                           </a:solidFill>
@@ -6976,7 +6957,7 @@
                     <a:lstStyle/>
                     <a:p>
                       <a:r>
-                        <a:rPr sz="1100">
+                        <a:rPr sz="800">
                           <a:solidFill>
                             <a:srgbClr val="000000"/>
                           </a:solidFill>
@@ -6997,7 +6978,7 @@
                     <a:lstStyle/>
                     <a:p>
                       <a:r>
-                        <a:rPr sz="1100">
+                        <a:rPr sz="800">
                           <a:solidFill>
                             <a:srgbClr val="4472C4"/>
                           </a:solidFill>
@@ -7013,14 +6994,14 @@
                   </a:tcPr>
                 </a:tc>
               </a:tr>
-              <a:tr h="304800">
-                <a:tc>
-                  <a:txBody>
-                    <a:bodyPr/>
-                    <a:lstStyle/>
-                    <a:p>
-                      <a:r>
-                        <a:rPr sz="1100">
+              <a:tr h="0">
+                <a:tc>
+                  <a:txBody>
+                    <a:bodyPr/>
+                    <a:lstStyle/>
+                    <a:p>
+                      <a:r>
+                        <a:rPr sz="800">
                           <a:solidFill>
                             <a:srgbClr val="000000"/>
                           </a:solidFill>
@@ -7041,7 +7022,7 @@
                     <a:lstStyle/>
                     <a:p>
                       <a:r>
-                        <a:rPr sz="1100">
+                        <a:rPr sz="800">
                           <a:solidFill>
                             <a:srgbClr val="000000"/>
                           </a:solidFill>
@@ -7062,7 +7043,7 @@
                     <a:lstStyle/>
                     <a:p>
                       <a:r>
-                        <a:rPr sz="1100">
+                        <a:rPr sz="800">
                           <a:solidFill>
                             <a:srgbClr val="FF0000"/>
                           </a:solidFill>
@@ -7083,7 +7064,7 @@
                     <a:lstStyle/>
                     <a:p>
                       <a:r>
-                        <a:rPr sz="1100">
+                        <a:rPr sz="800">
                           <a:solidFill>
                             <a:srgbClr val="000000"/>
                           </a:solidFill>
@@ -7104,7 +7085,7 @@
                     <a:lstStyle/>
                     <a:p>
                       <a:r>
-                        <a:rPr sz="1100">
+                        <a:rPr sz="800">
                           <a:solidFill>
                             <a:srgbClr val="FF0000"/>
                           </a:solidFill>
@@ -7125,7 +7106,7 @@
                     <a:lstStyle/>
                     <a:p>
                       <a:r>
-                        <a:rPr sz="1100">
+                        <a:rPr sz="800">
                           <a:solidFill>
                             <a:srgbClr val="000000"/>
                           </a:solidFill>
@@ -7146,7 +7127,7 @@
                     <a:lstStyle/>
                     <a:p>
                       <a:r>
-                        <a:rPr sz="1100">
+                        <a:rPr sz="800">
                           <a:solidFill>
                             <a:srgbClr val="000000"/>
                           </a:solidFill>
@@ -7167,7 +7148,7 @@
                     <a:lstStyle/>
                     <a:p>
                       <a:r>
-                        <a:rPr sz="1100">
+                        <a:rPr sz="800">
                           <a:solidFill>
                             <a:srgbClr val="4472C4"/>
                           </a:solidFill>
@@ -7183,14 +7164,14 @@
                   </a:tcPr>
                 </a:tc>
               </a:tr>
-              <a:tr h="304800">
-                <a:tc>
-                  <a:txBody>
-                    <a:bodyPr/>
-                    <a:lstStyle/>
-                    <a:p>
-                      <a:r>
-                        <a:rPr sz="1100">
+              <a:tr h="0">
+                <a:tc>
+                  <a:txBody>
+                    <a:bodyPr/>
+                    <a:lstStyle/>
+                    <a:p>
+                      <a:r>
+                        <a:rPr sz="800">
                           <a:solidFill>
                             <a:srgbClr val="000000"/>
                           </a:solidFill>
@@ -7211,7 +7192,7 @@
                     <a:lstStyle/>
                     <a:p>
                       <a:r>
-                        <a:rPr sz="1100">
+                        <a:rPr sz="800">
                           <a:solidFill>
                             <a:srgbClr val="000000"/>
                           </a:solidFill>
@@ -7232,7 +7213,7 @@
                     <a:lstStyle/>
                     <a:p>
                       <a:r>
-                        <a:rPr sz="1100">
+                        <a:rPr sz="800">
                           <a:solidFill>
                             <a:srgbClr val="FF0000"/>
                           </a:solidFill>
@@ -7253,7 +7234,7 @@
                     <a:lstStyle/>
                     <a:p>
                       <a:r>
-                        <a:rPr sz="1100">
+                        <a:rPr sz="800">
                           <a:solidFill>
                             <a:srgbClr val="000000"/>
                           </a:solidFill>
@@ -7274,7 +7255,7 @@
                     <a:lstStyle/>
                     <a:p>
                       <a:r>
-                        <a:rPr sz="1100">
+                        <a:rPr sz="800">
                           <a:solidFill>
                             <a:srgbClr val="000000"/>
                           </a:solidFill>
@@ -7295,7 +7276,7 @@
                     <a:lstStyle/>
                     <a:p>
                       <a:r>
-                        <a:rPr sz="1100">
+                        <a:rPr sz="800">
                           <a:solidFill>
                             <a:srgbClr val="000000"/>
                           </a:solidFill>
@@ -7316,7 +7297,7 @@
                     <a:lstStyle/>
                     <a:p>
                       <a:r>
-                        <a:rPr sz="1100">
+                        <a:rPr sz="800">
                           <a:solidFill>
                             <a:srgbClr val="000000"/>
                           </a:solidFill>
@@ -7337,7 +7318,7 @@
                     <a:lstStyle/>
                     <a:p>
                       <a:r>
-                        <a:rPr sz="1100">
+                        <a:rPr sz="800">
                           <a:solidFill>
                             <a:srgbClr val="4472C4"/>
                           </a:solidFill>
@@ -7353,14 +7334,14 @@
                   </a:tcPr>
                 </a:tc>
               </a:tr>
-              <a:tr h="304800">
-                <a:tc>
-                  <a:txBody>
-                    <a:bodyPr/>
-                    <a:lstStyle/>
-                    <a:p>
-                      <a:r>
-                        <a:rPr sz="1100">
+              <a:tr h="0">
+                <a:tc>
+                  <a:txBody>
+                    <a:bodyPr/>
+                    <a:lstStyle/>
+                    <a:p>
+                      <a:r>
+                        <a:rPr sz="800">
                           <a:solidFill>
                             <a:srgbClr val="000000"/>
                           </a:solidFill>
@@ -7381,7 +7362,7 @@
                     <a:lstStyle/>
                     <a:p>
                       <a:r>
-                        <a:rPr sz="1100">
+                        <a:rPr sz="800">
                           <a:solidFill>
                             <a:srgbClr val="000000"/>
                           </a:solidFill>
@@ -7402,7 +7383,7 @@
                     <a:lstStyle/>
                     <a:p>
                       <a:r>
-                        <a:rPr sz="1100">
+                        <a:rPr sz="800">
                           <a:solidFill>
                             <a:srgbClr val="FF0000"/>
                           </a:solidFill>
@@ -7423,7 +7404,7 @@
                     <a:lstStyle/>
                     <a:p>
                       <a:r>
-                        <a:rPr sz="1100">
+                        <a:rPr sz="800">
                           <a:solidFill>
                             <a:srgbClr val="0070C0"/>
                           </a:solidFill>
@@ -7444,7 +7425,7 @@
                     <a:lstStyle/>
                     <a:p>
                       <a:r>
-                        <a:rPr sz="1100">
+                        <a:rPr sz="800">
                           <a:solidFill>
                             <a:srgbClr val="0070C0"/>
                           </a:solidFill>
@@ -7465,7 +7446,7 @@
                     <a:lstStyle/>
                     <a:p>
                       <a:r>
-                        <a:rPr sz="1100">
+                        <a:rPr sz="800">
                           <a:solidFill>
                             <a:srgbClr val="0070C0"/>
                           </a:solidFill>
@@ -7486,7 +7467,7 @@
                     <a:lstStyle/>
                     <a:p>
                       <a:r>
-                        <a:rPr sz="1100">
+                        <a:rPr sz="800">
                           <a:solidFill>
                             <a:srgbClr val="000000"/>
                           </a:solidFill>
@@ -7507,7 +7488,7 @@
                     <a:lstStyle/>
                     <a:p>
                       <a:r>
-                        <a:rPr sz="1100">
+                        <a:rPr sz="800">
                           <a:solidFill>
                             <a:srgbClr val="4472C4"/>
                           </a:solidFill>
@@ -7523,14 +7504,14 @@
                   </a:tcPr>
                 </a:tc>
               </a:tr>
-              <a:tr h="304800">
-                <a:tc>
-                  <a:txBody>
-                    <a:bodyPr/>
-                    <a:lstStyle/>
-                    <a:p>
-                      <a:r>
-                        <a:rPr sz="1100">
+              <a:tr h="0">
+                <a:tc>
+                  <a:txBody>
+                    <a:bodyPr/>
+                    <a:lstStyle/>
+                    <a:p>
+                      <a:r>
+                        <a:rPr sz="800">
                           <a:solidFill>
                             <a:srgbClr val="000000"/>
                           </a:solidFill>
@@ -7551,7 +7532,7 @@
                     <a:lstStyle/>
                     <a:p>
                       <a:r>
-                        <a:rPr sz="1100">
+                        <a:rPr sz="800">
                           <a:solidFill>
                             <a:srgbClr val="000000"/>
                           </a:solidFill>
@@ -7572,7 +7553,7 @@
                     <a:lstStyle/>
                     <a:p>
                       <a:r>
-                        <a:rPr sz="1100">
+                        <a:rPr sz="800">
                           <a:solidFill>
                             <a:srgbClr val="000000"/>
                           </a:solidFill>
@@ -7593,7 +7574,7 @@
                     <a:lstStyle/>
                     <a:p>
                       <a:r>
-                        <a:rPr sz="1100">
+                        <a:rPr sz="800">
                           <a:solidFill>
                             <a:srgbClr val="000000"/>
                           </a:solidFill>
@@ -7614,7 +7595,7 @@
                     <a:lstStyle/>
                     <a:p>
                       <a:r>
-                        <a:rPr sz="1100">
+                        <a:rPr sz="800">
                           <a:solidFill>
                             <a:srgbClr val="000000"/>
                           </a:solidFill>
@@ -7635,7 +7616,7 @@
                     <a:lstStyle/>
                     <a:p>
                       <a:r>
-                        <a:rPr sz="1100">
+                        <a:rPr sz="800">
                           <a:solidFill>
                             <a:srgbClr val="000000"/>
                           </a:solidFill>
@@ -7656,7 +7637,7 @@
                     <a:lstStyle/>
                     <a:p>
                       <a:r>
-                        <a:rPr sz="1100">
+                        <a:rPr sz="800">
                           <a:solidFill>
                             <a:srgbClr val="000000"/>
                           </a:solidFill>
@@ -7677,7 +7658,7 @@
                     <a:lstStyle/>
                     <a:p>
                       <a:r>
-                        <a:rPr sz="1100">
+                        <a:rPr sz="800">
                           <a:solidFill>
                             <a:srgbClr val="000000"/>
                           </a:solidFill>
@@ -7693,14 +7674,14 @@
                   </a:tcPr>
                 </a:tc>
               </a:tr>
-              <a:tr h="304800">
-                <a:tc>
-                  <a:txBody>
-                    <a:bodyPr/>
-                    <a:lstStyle/>
-                    <a:p>
-                      <a:r>
-                        <a:rPr sz="1100">
+              <a:tr h="0">
+                <a:tc>
+                  <a:txBody>
+                    <a:bodyPr/>
+                    <a:lstStyle/>
+                    <a:p>
+                      <a:r>
+                        <a:rPr sz="800">
                           <a:solidFill>
                             <a:srgbClr val="000000"/>
                           </a:solidFill>
@@ -7721,7 +7702,7 @@
                     <a:lstStyle/>
                     <a:p>
                       <a:r>
-                        <a:rPr sz="1100">
+                        <a:rPr sz="800">
                           <a:solidFill>
                             <a:srgbClr val="000000"/>
                           </a:solidFill>
@@ -7742,7 +7723,7 @@
                     <a:lstStyle/>
                     <a:p>
                       <a:r>
-                        <a:rPr sz="1100">
+                        <a:rPr sz="800">
                           <a:solidFill>
                             <a:srgbClr val="000000"/>
                           </a:solidFill>
@@ -7763,7 +7744,7 @@
                     <a:lstStyle/>
                     <a:p>
                       <a:r>
-                        <a:rPr sz="1100">
+                        <a:rPr sz="800">
                           <a:solidFill>
                             <a:srgbClr val="000000"/>
                           </a:solidFill>
@@ -7784,7 +7765,7 @@
                     <a:lstStyle/>
                     <a:p>
                       <a:r>
-                        <a:rPr sz="1100">
+                        <a:rPr sz="800">
                           <a:solidFill>
                             <a:srgbClr val="000000"/>
                           </a:solidFill>
@@ -7805,7 +7786,7 @@
                     <a:lstStyle/>
                     <a:p>
                       <a:r>
-                        <a:rPr sz="1100">
+                        <a:rPr sz="800">
                           <a:solidFill>
                             <a:srgbClr val="000000"/>
                           </a:solidFill>
@@ -7826,7 +7807,7 @@
                     <a:lstStyle/>
                     <a:p>
                       <a:r>
-                        <a:rPr sz="1100">
+                        <a:rPr sz="800">
                           <a:solidFill>
                             <a:srgbClr val="000000"/>
                           </a:solidFill>
@@ -7847,7 +7828,7 @@
                     <a:lstStyle/>
                     <a:p>
                       <a:r>
-                        <a:rPr sz="1100">
+                        <a:rPr sz="800">
                           <a:solidFill>
                             <a:srgbClr val="000000"/>
                           </a:solidFill>
@@ -7863,14 +7844,14 @@
                   </a:tcPr>
                 </a:tc>
               </a:tr>
-              <a:tr h="304800">
-                <a:tc>
-                  <a:txBody>
-                    <a:bodyPr/>
-                    <a:lstStyle/>
-                    <a:p>
-                      <a:r>
-                        <a:rPr sz="1100">
+              <a:tr h="0">
+                <a:tc>
+                  <a:txBody>
+                    <a:bodyPr/>
+                    <a:lstStyle/>
+                    <a:p>
+                      <a:r>
+                        <a:rPr sz="800">
                           <a:solidFill>
                             <a:srgbClr val="000000"/>
                           </a:solidFill>
@@ -7891,7 +7872,7 @@
                     <a:lstStyle/>
                     <a:p>
                       <a:r>
-                        <a:rPr sz="1100">
+                        <a:rPr sz="800">
                           <a:solidFill>
                             <a:srgbClr val="000000"/>
                           </a:solidFill>
@@ -7912,7 +7893,7 @@
                     <a:lstStyle/>
                     <a:p>
                       <a:r>
-                        <a:rPr sz="1100">
+                        <a:rPr sz="800">
                           <a:solidFill>
                             <a:srgbClr val="000000"/>
                           </a:solidFill>
@@ -7933,7 +7914,7 @@
                     <a:lstStyle/>
                     <a:p>
                       <a:r>
-                        <a:rPr sz="1100">
+                        <a:rPr sz="800">
                           <a:solidFill>
                             <a:srgbClr val="000000"/>
                           </a:solidFill>
@@ -7954,7 +7935,7 @@
                     <a:lstStyle/>
                     <a:p>
                       <a:r>
-                        <a:rPr sz="1100">
+                        <a:rPr sz="800">
                           <a:solidFill>
                             <a:srgbClr val="000000"/>
                           </a:solidFill>
@@ -7975,7 +7956,7 @@
                     <a:lstStyle/>
                     <a:p>
                       <a:r>
-                        <a:rPr sz="1100">
+                        <a:rPr sz="800">
                           <a:solidFill>
                             <a:srgbClr val="000000"/>
                           </a:solidFill>
@@ -7996,7 +7977,7 @@
                     <a:lstStyle/>
                     <a:p>
                       <a:r>
-                        <a:rPr sz="1100">
+                        <a:rPr sz="800">
                           <a:solidFill>
                             <a:srgbClr val="000000"/>
                           </a:solidFill>
@@ -8017,7 +7998,7 @@
                     <a:lstStyle/>
                     <a:p>
                       <a:r>
-                        <a:rPr sz="1100">
+                        <a:rPr sz="800">
                           <a:solidFill>
                             <a:srgbClr val="000000"/>
                           </a:solidFill>

</xml_diff>